<commit_message>
[DOCs] Fixed APB3 issue in lab1 APB3 image
</commit_message>
<xml_diff>
--- a/doc/Labs/LabWork1/LabWork1.pptx
+++ b/doc/Labs/LabWork1/LabWork1.pptx
@@ -152,7 +152,7 @@
       </p14:sectionLst>
     </p:ext>
     <p:ext uri="{EFAFB233-063F-42B5-8137-9DF3F51BA10A}">
-      <p15:sldGuideLst xmlns:p15="http://schemas.microsoft.com/office/powerpoint/2012/main">
+      <p15:sldGuideLst xmlns="" xmlns:p15="http://schemas.microsoft.com/office/powerpoint/2012/main">
         <p15:guide id="1" orient="horz" pos="2160">
           <p15:clr>
             <a:srgbClr val="A4A3A4"/>
@@ -251,7 +251,7 @@
           <a:p>
             <a:fld id="{ABCC478D-9571-4DA3-A228-C57D01FD3581}" type="datetimeFigureOut">
               <a:rPr lang="ru-RU" smtClean="0"/>
-              <a:t>06.02.2022</a:t>
+              <a:t>14.02.2022</a:t>
             </a:fld>
             <a:endParaRPr lang="ru-RU"/>
           </a:p>
@@ -790,7 +790,7 @@
           <a:p>
             <a:fld id="{B4C71EC6-210F-42DE-9C53-41977AD35B3D}" type="datetimeFigureOut">
               <a:rPr lang="ru-RU" smtClean="0"/>
-              <a:t>06.02.2022</a:t>
+              <a:t>14.02.2022</a:t>
             </a:fld>
             <a:endParaRPr lang="ru-RU"/>
           </a:p>
@@ -990,7 +990,7 @@
           <a:p>
             <a:fld id="{B4C71EC6-210F-42DE-9C53-41977AD35B3D}" type="datetimeFigureOut">
               <a:rPr lang="ru-RU" smtClean="0"/>
-              <a:t>06.02.2022</a:t>
+              <a:t>14.02.2022</a:t>
             </a:fld>
             <a:endParaRPr lang="ru-RU"/>
           </a:p>
@@ -1165,7 +1165,7 @@
           <a:p>
             <a:fld id="{B4C71EC6-210F-42DE-9C53-41977AD35B3D}" type="datetimeFigureOut">
               <a:rPr lang="ru-RU" smtClean="0"/>
-              <a:t>06.02.2022</a:t>
+              <a:t>14.02.2022</a:t>
             </a:fld>
             <a:endParaRPr lang="ru-RU"/>
           </a:p>
@@ -1330,7 +1330,7 @@
           <a:p>
             <a:fld id="{B4C71EC6-210F-42DE-9C53-41977AD35B3D}" type="datetimeFigureOut">
               <a:rPr lang="ru-RU" smtClean="0"/>
-              <a:t>06.02.2022</a:t>
+              <a:t>14.02.2022</a:t>
             </a:fld>
             <a:endParaRPr lang="ru-RU"/>
           </a:p>
@@ -1578,7 +1578,7 @@
           <a:p>
             <a:fld id="{B4C71EC6-210F-42DE-9C53-41977AD35B3D}" type="datetimeFigureOut">
               <a:rPr lang="ru-RU" smtClean="0"/>
-              <a:t>06.02.2022</a:t>
+              <a:t>14.02.2022</a:t>
             </a:fld>
             <a:endParaRPr lang="ru-RU"/>
           </a:p>
@@ -1896,7 +1896,7 @@
           <a:p>
             <a:fld id="{B4C71EC6-210F-42DE-9C53-41977AD35B3D}" type="datetimeFigureOut">
               <a:rPr lang="ru-RU" smtClean="0"/>
-              <a:t>06.02.2022</a:t>
+              <a:t>14.02.2022</a:t>
             </a:fld>
             <a:endParaRPr lang="ru-RU"/>
           </a:p>
@@ -2362,7 +2362,7 @@
           <a:p>
             <a:fld id="{B4C71EC6-210F-42DE-9C53-41977AD35B3D}" type="datetimeFigureOut">
               <a:rPr lang="ru-RU" smtClean="0"/>
-              <a:t>06.02.2022</a:t>
+              <a:t>14.02.2022</a:t>
             </a:fld>
             <a:endParaRPr lang="ru-RU"/>
           </a:p>
@@ -2510,7 +2510,7 @@
           <a:p>
             <a:fld id="{B4C71EC6-210F-42DE-9C53-41977AD35B3D}" type="datetimeFigureOut">
               <a:rPr lang="ru-RU" smtClean="0"/>
-              <a:t>06.02.2022</a:t>
+              <a:t>14.02.2022</a:t>
             </a:fld>
             <a:endParaRPr lang="ru-RU"/>
           </a:p>
@@ -2600,7 +2600,7 @@
           <a:p>
             <a:fld id="{B4C71EC6-210F-42DE-9C53-41977AD35B3D}" type="datetimeFigureOut">
               <a:rPr lang="ru-RU" smtClean="0"/>
-              <a:t>06.02.2022</a:t>
+              <a:t>14.02.2022</a:t>
             </a:fld>
             <a:endParaRPr lang="ru-RU"/>
           </a:p>
@@ -2874,7 +2874,7 @@
           <a:p>
             <a:fld id="{B4C71EC6-210F-42DE-9C53-41977AD35B3D}" type="datetimeFigureOut">
               <a:rPr lang="ru-RU" smtClean="0"/>
-              <a:t>06.02.2022</a:t>
+              <a:t>14.02.2022</a:t>
             </a:fld>
             <a:endParaRPr lang="ru-RU"/>
           </a:p>
@@ -3179,7 +3179,7 @@
           <a:p>
             <a:fld id="{B4C71EC6-210F-42DE-9C53-41977AD35B3D}" type="datetimeFigureOut">
               <a:rPr lang="ru-RU" smtClean="0"/>
-              <a:t>06.02.2022</a:t>
+              <a:t>14.02.2022</a:t>
             </a:fld>
             <a:endParaRPr lang="ru-RU"/>
           </a:p>
@@ -3477,7 +3477,7 @@
           <a:p>
             <a:fld id="{B4C71EC6-210F-42DE-9C53-41977AD35B3D}" type="datetimeFigureOut">
               <a:rPr lang="ru-RU" smtClean="0"/>
-              <a:t>06.02.2022</a:t>
+              <a:t>14.02.2022</a:t>
             </a:fld>
             <a:endParaRPr lang="ru-RU"/>
           </a:p>
@@ -4008,7 +4008,7 @@
           <p:cNvPr id="6" name="TextBox 5">
             <a:extLst>
               <a:ext uri="{FF2B5EF4-FFF2-40B4-BE49-F238E27FC236}">
-                <a16:creationId xmlns:a16="http://schemas.microsoft.com/office/drawing/2014/main" id="{087CE33E-9E53-4903-8DB4-D8BE2A63240A}"/>
+                <a16:creationId xmlns="" xmlns:a16="http://schemas.microsoft.com/office/drawing/2014/main" id="{087CE33E-9E53-4903-8DB4-D8BE2A63240A}"/>
               </a:ext>
             </a:extLst>
           </p:cNvPr>
@@ -4199,7 +4199,7 @@
           <p:cNvPr id="7" name="TextBox 6">
             <a:extLst>
               <a:ext uri="{FF2B5EF4-FFF2-40B4-BE49-F238E27FC236}">
-                <a16:creationId xmlns:a16="http://schemas.microsoft.com/office/drawing/2014/main" id="{E76BDB79-6248-40B5-B19B-AA232E889C93}"/>
+                <a16:creationId xmlns="" xmlns:a16="http://schemas.microsoft.com/office/drawing/2014/main" id="{E76BDB79-6248-40B5-B19B-AA232E889C93}"/>
               </a:ext>
             </a:extLst>
           </p:cNvPr>
@@ -4361,7 +4361,7 @@
           <p:cNvPr id="8" name="Стрелка: вправо 7">
             <a:extLst>
               <a:ext uri="{FF2B5EF4-FFF2-40B4-BE49-F238E27FC236}">
-                <a16:creationId xmlns:a16="http://schemas.microsoft.com/office/drawing/2014/main" id="{C158FCDE-021F-4641-8242-F03457A3435C}"/>
+                <a16:creationId xmlns="" xmlns:a16="http://schemas.microsoft.com/office/drawing/2014/main" id="{C158FCDE-021F-4641-8242-F03457A3435C}"/>
               </a:ext>
             </a:extLst>
           </p:cNvPr>
@@ -4437,7 +4437,7 @@
           <p:cNvPr id="8" name="Заголовок 1">
             <a:extLst>
               <a:ext uri="{FF2B5EF4-FFF2-40B4-BE49-F238E27FC236}">
-                <a16:creationId xmlns:a16="http://schemas.microsoft.com/office/drawing/2014/main" id="{A0702EFC-3890-4F7C-9277-E54B8A73B0F0}"/>
+                <a16:creationId xmlns="" xmlns:a16="http://schemas.microsoft.com/office/drawing/2014/main" id="{A0702EFC-3890-4F7C-9277-E54B8A73B0F0}"/>
               </a:ext>
             </a:extLst>
           </p:cNvPr>
@@ -4472,7 +4472,7 @@
           <p:cNvPr id="11" name="TextBox 10">
             <a:extLst>
               <a:ext uri="{FF2B5EF4-FFF2-40B4-BE49-F238E27FC236}">
-                <a16:creationId xmlns:a16="http://schemas.microsoft.com/office/drawing/2014/main" id="{A68CE8C7-8854-4CDA-B81B-31929C82FE44}"/>
+                <a16:creationId xmlns="" xmlns:a16="http://schemas.microsoft.com/office/drawing/2014/main" id="{A68CE8C7-8854-4CDA-B81B-31929C82FE44}"/>
               </a:ext>
             </a:extLst>
           </p:cNvPr>
@@ -4776,7 +4776,7 @@
           <p:cNvPr id="12" name="TextBox 11">
             <a:extLst>
               <a:ext uri="{FF2B5EF4-FFF2-40B4-BE49-F238E27FC236}">
-                <a16:creationId xmlns:a16="http://schemas.microsoft.com/office/drawing/2014/main" id="{0C6B2A46-C845-4C12-897D-D51E57E8A09A}"/>
+                <a16:creationId xmlns="" xmlns:a16="http://schemas.microsoft.com/office/drawing/2014/main" id="{0C6B2A46-C845-4C12-897D-D51E57E8A09A}"/>
               </a:ext>
             </a:extLst>
           </p:cNvPr>
@@ -5014,7 +5014,7 @@
           <p:cNvPr id="6" name="TextBox 5">
             <a:extLst>
               <a:ext uri="{FF2B5EF4-FFF2-40B4-BE49-F238E27FC236}">
-                <a16:creationId xmlns:a16="http://schemas.microsoft.com/office/drawing/2014/main" id="{16A14F42-B925-4C14-AAE7-E9FA5F8F32F1}"/>
+                <a16:creationId xmlns="" xmlns:a16="http://schemas.microsoft.com/office/drawing/2014/main" id="{16A14F42-B925-4C14-AAE7-E9FA5F8F32F1}"/>
               </a:ext>
             </a:extLst>
           </p:cNvPr>
@@ -5408,7 +5408,7 @@
           <p:cNvPr id="7" name="TextBox 6">
             <a:extLst>
               <a:ext uri="{FF2B5EF4-FFF2-40B4-BE49-F238E27FC236}">
-                <a16:creationId xmlns:a16="http://schemas.microsoft.com/office/drawing/2014/main" id="{DA44D499-E4FF-4B75-AEEA-F795CD895518}"/>
+                <a16:creationId xmlns="" xmlns:a16="http://schemas.microsoft.com/office/drawing/2014/main" id="{DA44D499-E4FF-4B75-AEEA-F795CD895518}"/>
               </a:ext>
             </a:extLst>
           </p:cNvPr>
@@ -5767,7 +5767,7 @@
       </p:sp>
       <p:pic>
         <p:nvPicPr>
-          <p:cNvPr id="1026" name="Picture 2" descr="C:\Users\kalistratov\Downloads\Untitled Diagram-Page-3.drawio (1).png"/>
+          <p:cNvPr id="1026" name="Picture 2" descr="C:\Users\kalistratov\Downloads\Untitled Diagram-Page-3.drawio (3).png"/>
           <p:cNvPicPr>
             <a:picLocks noChangeAspect="1" noChangeArrowheads="1"/>
           </p:cNvPicPr>
@@ -5788,8 +5788,8 @@
         </p:blipFill>
         <p:spPr bwMode="auto">
           <a:xfrm>
-            <a:off x="1619672" y="1772816"/>
-            <a:ext cx="5904656" cy="4446846"/>
+            <a:off x="1763688" y="1988840"/>
+            <a:ext cx="5436719" cy="4304601"/>
           </a:xfrm>
           <a:prstGeom prst="rect">
             <a:avLst/>
@@ -6353,7 +6353,7 @@
           <p:cNvPr id="3" name="Объект 2">
             <a:extLst>
               <a:ext uri="{FF2B5EF4-FFF2-40B4-BE49-F238E27FC236}">
-                <a16:creationId xmlns:a16="http://schemas.microsoft.com/office/drawing/2014/main" id="{342F5B4A-C29B-4C94-876A-94A944501DBF}"/>
+                <a16:creationId xmlns="" xmlns:a16="http://schemas.microsoft.com/office/drawing/2014/main" id="{342F5B4A-C29B-4C94-876A-94A944501DBF}"/>
               </a:ext>
             </a:extLst>
           </p:cNvPr>
@@ -6452,7 +6452,7 @@
           <p:cNvPr id="5" name="Заголовок 1">
             <a:extLst>
               <a:ext uri="{FF2B5EF4-FFF2-40B4-BE49-F238E27FC236}">
-                <a16:creationId xmlns:a16="http://schemas.microsoft.com/office/drawing/2014/main" id="{92A987DF-307E-4C50-98E9-DF5A55DD1985}"/>
+                <a16:creationId xmlns="" xmlns:a16="http://schemas.microsoft.com/office/drawing/2014/main" id="{92A987DF-307E-4C50-98E9-DF5A55DD1985}"/>
               </a:ext>
             </a:extLst>
           </p:cNvPr>
@@ -7289,7 +7289,7 @@
           <p:cNvPr id="4" name="Picture 2" descr="C:\Users\kalistratov\Downloads\Untitled Diagram-Page-4.drawio (1).png">
             <a:extLst>
               <a:ext uri="{FF2B5EF4-FFF2-40B4-BE49-F238E27FC236}">
-                <a16:creationId xmlns:a16="http://schemas.microsoft.com/office/drawing/2014/main" id="{6590C860-B276-4FDC-86F1-99F2BA416071}"/>
+                <a16:creationId xmlns="" xmlns:a16="http://schemas.microsoft.com/office/drawing/2014/main" id="{6590C860-B276-4FDC-86F1-99F2BA416071}"/>
               </a:ext>
             </a:extLst>
           </p:cNvPr>
@@ -7336,7 +7336,7 @@
           <p:cNvPr id="5" name="Заголовок 1">
             <a:extLst>
               <a:ext uri="{FF2B5EF4-FFF2-40B4-BE49-F238E27FC236}">
-                <a16:creationId xmlns:a16="http://schemas.microsoft.com/office/drawing/2014/main" id="{C7B9CDE6-7130-43A2-BD20-21AC53DA3232}"/>
+                <a16:creationId xmlns="" xmlns:a16="http://schemas.microsoft.com/office/drawing/2014/main" id="{C7B9CDE6-7130-43A2-BD20-21AC53DA3232}"/>
               </a:ext>
             </a:extLst>
           </p:cNvPr>
@@ -7393,7 +7393,7 @@
           <p:cNvPr id="6" name="Заголовок 1">
             <a:extLst>
               <a:ext uri="{FF2B5EF4-FFF2-40B4-BE49-F238E27FC236}">
-                <a16:creationId xmlns:a16="http://schemas.microsoft.com/office/drawing/2014/main" id="{D68498DB-2CE4-40E7-891E-3BC77A18CD31}"/>
+                <a16:creationId xmlns="" xmlns:a16="http://schemas.microsoft.com/office/drawing/2014/main" id="{D68498DB-2CE4-40E7-891E-3BC77A18CD31}"/>
               </a:ext>
             </a:extLst>
           </p:cNvPr>
@@ -7522,7 +7522,7 @@
           <p:cNvPr id="8" name="TextBox 7">
             <a:extLst>
               <a:ext uri="{FF2B5EF4-FFF2-40B4-BE49-F238E27FC236}">
-                <a16:creationId xmlns:a16="http://schemas.microsoft.com/office/drawing/2014/main" id="{7DA1C336-C8AB-4100-9E7E-567D0A0A8A57}"/>
+                <a16:creationId xmlns="" xmlns:a16="http://schemas.microsoft.com/office/drawing/2014/main" id="{7DA1C336-C8AB-4100-9E7E-567D0A0A8A57}"/>
               </a:ext>
             </a:extLst>
           </p:cNvPr>
@@ -7754,7 +7754,7 @@
           <p:cNvPr id="9" name="TextBox 8">
             <a:extLst>
               <a:ext uri="{FF2B5EF4-FFF2-40B4-BE49-F238E27FC236}">
-                <a16:creationId xmlns:a16="http://schemas.microsoft.com/office/drawing/2014/main" id="{6650159E-5159-4F4F-84F2-EA83DE001A8B}"/>
+                <a16:creationId xmlns="" xmlns:a16="http://schemas.microsoft.com/office/drawing/2014/main" id="{6650159E-5159-4F4F-84F2-EA83DE001A8B}"/>
               </a:ext>
             </a:extLst>
           </p:cNvPr>
@@ -7801,7 +7801,7 @@
           <p:cNvPr id="10" name="TextBox 9">
             <a:extLst>
               <a:ext uri="{FF2B5EF4-FFF2-40B4-BE49-F238E27FC236}">
-                <a16:creationId xmlns:a16="http://schemas.microsoft.com/office/drawing/2014/main" id="{A7FC6EE4-841F-41F6-8B0C-0CA2FCC167B3}"/>
+                <a16:creationId xmlns="" xmlns:a16="http://schemas.microsoft.com/office/drawing/2014/main" id="{A7FC6EE4-841F-41F6-8B0C-0CA2FCC167B3}"/>
               </a:ext>
             </a:extLst>
           </p:cNvPr>
@@ -8255,7 +8255,7 @@
     </a:clrScheme>
     <a:fontScheme name="Стандартная">
       <a:majorFont>
-        <a:latin typeface="Calibri Light" panose="020F0302020204030204"/>
+        <a:latin typeface="Calibri Light"/>
         <a:ea typeface=""/>
         <a:cs typeface=""/>
         <a:font script="Jpan" typeface="游ゴシック Light"/>
@@ -8307,7 +8307,7 @@
         <a:font script="Tfng" typeface="Ebrima"/>
       </a:majorFont>
       <a:minorFont>
-        <a:latin typeface="Calibri" panose="020F0502020204030204"/>
+        <a:latin typeface="Calibri"/>
         <a:ea typeface=""/>
         <a:cs typeface=""/>
         <a:font script="Jpan" typeface="游ゴシック"/>
@@ -8501,7 +8501,7 @@
   <a:extraClrSchemeLst/>
   <a:extLst>
     <a:ext uri="{05A4C25C-085E-4340-85A3-A5531E510DB2}">
-      <thm15:themeFamily xmlns:thm15="http://schemas.microsoft.com/office/thememl/2012/main" name="Office Theme" id="{62F939B6-93AF-4DB8-9C6B-D6C7DFDC589F}" vid="{4A3C46E8-61CC-4603-A589-7422A47A8E4A}"/>
+      <thm15:themeFamily xmlns="" xmlns:thm15="http://schemas.microsoft.com/office/thememl/2012/main" name="Office Theme" id="{62F939B6-93AF-4DB8-9C6B-D6C7DFDC589F}" vid="{4A3C46E8-61CC-4603-A589-7422A47A8E4A}"/>
     </a:ext>
   </a:extLst>
 </a:theme>

</xml_diff>